<commit_message>
mp4 only bug fix
</commit_message>
<xml_diff>
--- a/AzureMediaServices/Screenshots_Presentation/AzureMediaServices.pptx
+++ b/AzureMediaServices/Screenshots_Presentation/AzureMediaServices.pptx
@@ -18,11 +18,10 @@
     <p:sldId id="260" r:id="rId12"/>
     <p:sldId id="263" r:id="rId13"/>
     <p:sldId id="270" r:id="rId14"/>
-    <p:sldId id="261" r:id="rId15"/>
-    <p:sldId id="262" r:id="rId16"/>
-    <p:sldId id="271" r:id="rId17"/>
-    <p:sldId id="273" r:id="rId18"/>
-    <p:sldId id="272" r:id="rId19"/>
+    <p:sldId id="262" r:id="rId15"/>
+    <p:sldId id="271" r:id="rId16"/>
+    <p:sldId id="273" r:id="rId17"/>
+    <p:sldId id="272" r:id="rId18"/>
   </p:sldIdLst>
   <p:sldSz cx="12192000" cy="6858000"/>
   <p:notesSz cx="6858000" cy="9144000"/>
@@ -258,7 +257,7 @@
           <a:p>
             <a:fld id="{1D62A97D-7C28-4079-BD5B-E1C85A1187C9}" type="datetimeFigureOut">
               <a:rPr lang="en-US" smtClean="0"/>
-              <a:t>7/7/2016</a:t>
+              <a:t>11/26/2016</a:t>
             </a:fld>
             <a:endParaRPr lang="en-US"/>
           </a:p>
@@ -426,7 +425,7 @@
           <a:p>
             <a:fld id="{1D62A97D-7C28-4079-BD5B-E1C85A1187C9}" type="datetimeFigureOut">
               <a:rPr lang="en-US" smtClean="0"/>
-              <a:t>7/7/2016</a:t>
+              <a:t>11/26/2016</a:t>
             </a:fld>
             <a:endParaRPr lang="en-US"/>
           </a:p>
@@ -604,7 +603,7 @@
           <a:p>
             <a:fld id="{1D62A97D-7C28-4079-BD5B-E1C85A1187C9}" type="datetimeFigureOut">
               <a:rPr lang="en-US" smtClean="0"/>
-              <a:t>7/7/2016</a:t>
+              <a:t>11/26/2016</a:t>
             </a:fld>
             <a:endParaRPr lang="en-US"/>
           </a:p>
@@ -772,7 +771,7 @@
           <a:p>
             <a:fld id="{1D62A97D-7C28-4079-BD5B-E1C85A1187C9}" type="datetimeFigureOut">
               <a:rPr lang="en-US" smtClean="0"/>
-              <a:t>7/7/2016</a:t>
+              <a:t>11/26/2016</a:t>
             </a:fld>
             <a:endParaRPr lang="en-US"/>
           </a:p>
@@ -1017,7 +1016,7 @@
           <a:p>
             <a:fld id="{1D62A97D-7C28-4079-BD5B-E1C85A1187C9}" type="datetimeFigureOut">
               <a:rPr lang="en-US" smtClean="0"/>
-              <a:t>7/7/2016</a:t>
+              <a:t>11/26/2016</a:t>
             </a:fld>
             <a:endParaRPr lang="en-US"/>
           </a:p>
@@ -1246,7 +1245,7 @@
           <a:p>
             <a:fld id="{1D62A97D-7C28-4079-BD5B-E1C85A1187C9}" type="datetimeFigureOut">
               <a:rPr lang="en-US" smtClean="0"/>
-              <a:t>7/7/2016</a:t>
+              <a:t>11/26/2016</a:t>
             </a:fld>
             <a:endParaRPr lang="en-US"/>
           </a:p>
@@ -1610,7 +1609,7 @@
           <a:p>
             <a:fld id="{1D62A97D-7C28-4079-BD5B-E1C85A1187C9}" type="datetimeFigureOut">
               <a:rPr lang="en-US" smtClean="0"/>
-              <a:t>7/7/2016</a:t>
+              <a:t>11/26/2016</a:t>
             </a:fld>
             <a:endParaRPr lang="en-US"/>
           </a:p>
@@ -1727,7 +1726,7 @@
           <a:p>
             <a:fld id="{1D62A97D-7C28-4079-BD5B-E1C85A1187C9}" type="datetimeFigureOut">
               <a:rPr lang="en-US" smtClean="0"/>
-              <a:t>7/7/2016</a:t>
+              <a:t>11/26/2016</a:t>
             </a:fld>
             <a:endParaRPr lang="en-US"/>
           </a:p>
@@ -1822,7 +1821,7 @@
           <a:p>
             <a:fld id="{1D62A97D-7C28-4079-BD5B-E1C85A1187C9}" type="datetimeFigureOut">
               <a:rPr lang="en-US" smtClean="0"/>
-              <a:t>7/7/2016</a:t>
+              <a:t>11/26/2016</a:t>
             </a:fld>
             <a:endParaRPr lang="en-US"/>
           </a:p>
@@ -2097,7 +2096,7 @@
           <a:p>
             <a:fld id="{1D62A97D-7C28-4079-BD5B-E1C85A1187C9}" type="datetimeFigureOut">
               <a:rPr lang="en-US" smtClean="0"/>
-              <a:t>7/7/2016</a:t>
+              <a:t>11/26/2016</a:t>
             </a:fld>
             <a:endParaRPr lang="en-US"/>
           </a:p>
@@ -2349,7 +2348,7 @@
           <a:p>
             <a:fld id="{1D62A97D-7C28-4079-BD5B-E1C85A1187C9}" type="datetimeFigureOut">
               <a:rPr lang="en-US" smtClean="0"/>
-              <a:t>7/7/2016</a:t>
+              <a:t>11/26/2016</a:t>
             </a:fld>
             <a:endParaRPr lang="en-US"/>
           </a:p>
@@ -2560,7 +2559,7 @@
           <a:p>
             <a:fld id="{1D62A97D-7C28-4079-BD5B-E1C85A1187C9}" type="datetimeFigureOut">
               <a:rPr lang="en-US" smtClean="0"/>
-              <a:t>7/7/2016</a:t>
+              <a:t>11/26/2016</a:t>
             </a:fld>
             <a:endParaRPr lang="en-US"/>
           </a:p>
@@ -3079,7 +3078,7 @@
                   <a:srgbClr val="00BCF2"/>
                 </a:solidFill>
               </a:rPr>
-              <a:t>Microsoft MVP (4 Times), Author, Speaker, Blogger</a:t>
+              <a:t>Microsoft MVP (5 Times), Author, Speaker, Blogger</a:t>
             </a:r>
           </a:p>
           <a:p>
@@ -4201,7 +4200,7 @@
         </p:nvSpPr>
         <p:spPr>
           <a:xfrm>
-            <a:off x="2044700" y="3911600"/>
+            <a:off x="1239158" y="3911600"/>
             <a:ext cx="1485900" cy="2501900"/>
           </a:xfrm>
           <a:prstGeom prst="rect">
@@ -4241,7 +4240,7 @@
         </p:nvSpPr>
         <p:spPr>
           <a:xfrm>
-            <a:off x="2235200" y="4102100"/>
+            <a:off x="1429658" y="4102100"/>
             <a:ext cx="1104900" cy="431800"/>
           </a:xfrm>
           <a:prstGeom prst="rect">
@@ -4290,7 +4289,7 @@
         </p:nvSpPr>
         <p:spPr>
           <a:xfrm>
-            <a:off x="2235200" y="4686300"/>
+            <a:off x="1429658" y="4686300"/>
             <a:ext cx="1104900" cy="431800"/>
           </a:xfrm>
           <a:prstGeom prst="rect">
@@ -4339,7 +4338,7 @@
         </p:nvSpPr>
         <p:spPr>
           <a:xfrm>
-            <a:off x="2235200" y="5238750"/>
+            <a:off x="1429658" y="5238750"/>
             <a:ext cx="1104900" cy="431800"/>
           </a:xfrm>
           <a:prstGeom prst="rect">
@@ -4388,7 +4387,7 @@
         </p:nvSpPr>
         <p:spPr>
           <a:xfrm>
-            <a:off x="2235200" y="5791200"/>
+            <a:off x="1429658" y="5791200"/>
             <a:ext cx="1104900" cy="431800"/>
           </a:xfrm>
           <a:prstGeom prst="rect">
@@ -4437,7 +4436,7 @@
         </p:nvSpPr>
         <p:spPr>
           <a:xfrm>
-            <a:off x="2025650" y="3251110"/>
+            <a:off x="1220108" y="3251110"/>
             <a:ext cx="1504950" cy="646331"/>
           </a:xfrm>
           <a:prstGeom prst="rect">
@@ -4472,7 +4471,7 @@
         </p:nvSpPr>
         <p:spPr>
           <a:xfrm>
-            <a:off x="5283200" y="3925759"/>
+            <a:off x="4477658" y="3925759"/>
             <a:ext cx="1485900" cy="2501900"/>
           </a:xfrm>
           <a:prstGeom prst="rect">
@@ -4512,7 +4511,7 @@
         </p:nvSpPr>
         <p:spPr>
           <a:xfrm>
-            <a:off x="5473700" y="4116259"/>
+            <a:off x="4668158" y="4116259"/>
             <a:ext cx="1117600" cy="431800"/>
           </a:xfrm>
           <a:prstGeom prst="rect">
@@ -4561,7 +4560,7 @@
         </p:nvSpPr>
         <p:spPr>
           <a:xfrm>
-            <a:off x="5473700" y="4700459"/>
+            <a:off x="4668158" y="4700459"/>
             <a:ext cx="1117600" cy="431800"/>
           </a:xfrm>
           <a:prstGeom prst="rect">
@@ -4610,7 +4609,7 @@
         </p:nvSpPr>
         <p:spPr>
           <a:xfrm>
-            <a:off x="5473700" y="5252909"/>
+            <a:off x="4668158" y="5252909"/>
             <a:ext cx="1117600" cy="431800"/>
           </a:xfrm>
           <a:prstGeom prst="rect">
@@ -4659,7 +4658,7 @@
         </p:nvSpPr>
         <p:spPr>
           <a:xfrm>
-            <a:off x="5473700" y="5805359"/>
+            <a:off x="4668158" y="5805359"/>
             <a:ext cx="1117600" cy="431800"/>
           </a:xfrm>
           <a:prstGeom prst="rect">
@@ -4708,7 +4707,7 @@
         </p:nvSpPr>
         <p:spPr>
           <a:xfrm>
-            <a:off x="5264150" y="3265269"/>
+            <a:off x="4458608" y="3265269"/>
             <a:ext cx="1504950" cy="646331"/>
           </a:xfrm>
           <a:prstGeom prst="rect">
@@ -4743,7 +4742,7 @@
         </p:nvCxnSpPr>
         <p:spPr>
           <a:xfrm>
-            <a:off x="3632200" y="4318000"/>
+            <a:off x="2826658" y="4318000"/>
             <a:ext cx="1511300" cy="0"/>
           </a:xfrm>
           <a:prstGeom prst="straightConnector1">
@@ -4776,7 +4775,7 @@
         </p:nvCxnSpPr>
         <p:spPr>
           <a:xfrm>
-            <a:off x="3632200" y="4927600"/>
+            <a:off x="2826658" y="4927600"/>
             <a:ext cx="1511300" cy="0"/>
           </a:xfrm>
           <a:prstGeom prst="straightConnector1">
@@ -4809,7 +4808,7 @@
         </p:nvCxnSpPr>
         <p:spPr>
           <a:xfrm>
-            <a:off x="3632200" y="5422900"/>
+            <a:off x="2826658" y="5422900"/>
             <a:ext cx="1511300" cy="0"/>
           </a:xfrm>
           <a:prstGeom prst="straightConnector1">
@@ -4842,7 +4841,7 @@
         </p:nvCxnSpPr>
         <p:spPr>
           <a:xfrm>
-            <a:off x="3632200" y="5969000"/>
+            <a:off x="2826658" y="5969000"/>
             <a:ext cx="1511300" cy="0"/>
           </a:xfrm>
           <a:prstGeom prst="straightConnector1">
@@ -4875,8 +4874,8 @@
         </p:nvSpPr>
         <p:spPr>
           <a:xfrm>
-            <a:off x="3803650" y="4052759"/>
-            <a:ext cx="1168400" cy="279400"/>
+            <a:off x="2998108" y="4052759"/>
+            <a:ext cx="1168400" cy="276999"/>
           </a:xfrm>
           <a:prstGeom prst="rect">
             <a:avLst/>
@@ -4895,7 +4894,7 @@
                   <a:schemeClr val="accent2"/>
                 </a:solidFill>
               </a:rPr>
-              <a:t>reference some</a:t>
+              <a:t>reference</a:t>
             </a:r>
           </a:p>
         </p:txBody>
@@ -4908,7 +4907,7 @@
         </p:nvSpPr>
         <p:spPr>
           <a:xfrm>
-            <a:off x="3803650" y="4648200"/>
+            <a:off x="2998108" y="4648200"/>
             <a:ext cx="1168400" cy="279400"/>
           </a:xfrm>
           <a:prstGeom prst="rect">
@@ -4928,7 +4927,7 @@
                   <a:schemeClr val="accent2"/>
                 </a:solidFill>
               </a:rPr>
-              <a:t>reference some</a:t>
+              <a:t>reference</a:t>
             </a:r>
           </a:p>
         </p:txBody>
@@ -4941,7 +4940,7 @@
         </p:nvSpPr>
         <p:spPr>
           <a:xfrm>
-            <a:off x="3787775" y="5164010"/>
+            <a:off x="2982233" y="5164010"/>
             <a:ext cx="1168400" cy="279400"/>
           </a:xfrm>
           <a:prstGeom prst="rect">
@@ -4961,7 +4960,7 @@
                   <a:schemeClr val="accent2"/>
                 </a:solidFill>
               </a:rPr>
-              <a:t>reference some</a:t>
+              <a:t>reference</a:t>
             </a:r>
           </a:p>
         </p:txBody>
@@ -4974,7 +4973,7 @@
         </p:nvSpPr>
         <p:spPr>
           <a:xfrm>
-            <a:off x="3787775" y="5713029"/>
+            <a:off x="2982233" y="5713029"/>
             <a:ext cx="1168400" cy="279400"/>
           </a:xfrm>
           <a:prstGeom prst="rect">
@@ -4994,11 +4993,68 @@
                   <a:schemeClr val="accent2"/>
                 </a:solidFill>
               </a:rPr>
-              <a:t>reference some</a:t>
-            </a:r>
-          </a:p>
-        </p:txBody>
-      </p:sp>
+              <a:t>reference</a:t>
+            </a:r>
+          </a:p>
+        </p:txBody>
+      </p:sp>
+      <p:pic>
+        <p:nvPicPr>
+          <p:cNvPr id="25" name="Picture 24"/>
+          <p:cNvPicPr>
+            <a:picLocks noChangeAspect="1"/>
+          </p:cNvPicPr>
+          <p:nvPr/>
+        </p:nvPicPr>
+        <p:blipFill>
+          <a:blip r:embed="rId2"/>
+          <a:stretch>
+            <a:fillRect/>
+          </a:stretch>
+        </p:blipFill>
+        <p:spPr>
+          <a:xfrm>
+            <a:off x="6694715" y="3723714"/>
+            <a:ext cx="5091526" cy="1163972"/>
+          </a:xfrm>
+          <a:prstGeom prst="rect">
+            <a:avLst/>
+          </a:prstGeom>
+        </p:spPr>
+      </p:pic>
+      <p:cxnSp>
+        <p:nvCxnSpPr>
+          <p:cNvPr id="26" name="Straight Arrow Connector 25"/>
+          <p:cNvCxnSpPr/>
+          <p:nvPr/>
+        </p:nvCxnSpPr>
+        <p:spPr>
+          <a:xfrm>
+            <a:off x="5869216" y="4308929"/>
+            <a:ext cx="651328" cy="0"/>
+          </a:xfrm>
+          <a:prstGeom prst="straightConnector1">
+            <a:avLst/>
+          </a:prstGeom>
+          <a:ln>
+            <a:tailEnd type="triangle"/>
+          </a:ln>
+        </p:spPr>
+        <p:style>
+          <a:lnRef idx="1">
+            <a:schemeClr val="accent2"/>
+          </a:lnRef>
+          <a:fillRef idx="0">
+            <a:schemeClr val="accent2"/>
+          </a:fillRef>
+          <a:effectRef idx="0">
+            <a:schemeClr val="accent2"/>
+          </a:effectRef>
+          <a:fontRef idx="minor">
+            <a:schemeClr val="tx1"/>
+          </a:fontRef>
+        </p:style>
+      </p:cxnSp>
     </p:spTree>
     <p:extLst>
       <p:ext uri="{BB962C8B-B14F-4D97-AF65-F5344CB8AC3E}">
@@ -5065,7 +5121,7 @@
                   </a:outerShdw>
                 </a:effectLst>
               </a:rPr>
-              <a:t>Demo – Console client using .NET SDK</a:t>
+              <a:t>Demo – MVC App Client using .NET SDK</a:t>
             </a:r>
             <a:endParaRPr lang="en-US" sz="4800" b="0" cap="none" spc="0" dirty="0">
               <a:ln w="0"/>
@@ -5138,15 +5194,21 @@
           <p:nvPr/>
         </p:nvPicPr>
         <p:blipFill>
-          <a:blip r:embed="rId2"/>
+          <a:blip r:embed="rId2">
+            <a:extLst>
+              <a:ext uri="{28A0092B-C50C-407E-A947-70E740481C1C}">
+                <a14:useLocalDpi xmlns:a14="http://schemas.microsoft.com/office/drawing/2010/main" val="0"/>
+              </a:ext>
+            </a:extLst>
+          </a:blip>
           <a:stretch>
             <a:fillRect/>
           </a:stretch>
         </p:blipFill>
         <p:spPr>
           <a:xfrm>
-            <a:off x="971118" y="1394372"/>
-            <a:ext cx="5938981" cy="2994748"/>
+            <a:off x="6479712" y="1335233"/>
+            <a:ext cx="3994324" cy="5249992"/>
           </a:xfrm>
           <a:prstGeom prst="rect">
             <a:avLst/>
@@ -5169,8 +5231,8 @@
         </p:blipFill>
         <p:spPr>
           <a:xfrm>
-            <a:off x="906918" y="4784235"/>
-            <a:ext cx="6158900" cy="1407984"/>
+            <a:off x="1006619" y="1335233"/>
+            <a:ext cx="4898382" cy="3270019"/>
           </a:xfrm>
           <a:prstGeom prst="rect">
             <a:avLst/>
@@ -5180,7 +5242,7 @@
     </p:spTree>
     <p:extLst>
       <p:ext uri="{BB962C8B-B14F-4D97-AF65-F5344CB8AC3E}">
-        <p14:creationId xmlns:p14="http://schemas.microsoft.com/office/powerpoint/2010/main" val="1005258430"/>
+        <p14:creationId xmlns:p14="http://schemas.microsoft.com/office/powerpoint/2010/main" val="3368870173"/>
       </p:ext>
     </p:extLst>
   </p:cSld>
@@ -5215,8 +5277,8 @@
         </p:nvSpPr>
         <p:spPr>
           <a:xfrm>
-            <a:off x="832104" y="396147"/>
-            <a:ext cx="10323575" cy="830997"/>
+            <a:off x="5112005" y="3013501"/>
+            <a:ext cx="3663696" cy="830997"/>
           </a:xfrm>
           <a:prstGeom prst="rect">
             <a:avLst/>
@@ -5243,7 +5305,7 @@
                   </a:outerShdw>
                 </a:effectLst>
               </a:rPr>
-              <a:t>Demo – MVC App Client using .NET SDK</a:t>
+              <a:t>Q &amp; A</a:t>
             </a:r>
             <a:endParaRPr lang="en-US" sz="4800" b="0" cap="none" spc="0" dirty="0">
               <a:ln w="0"/>
@@ -5307,64 +5369,10 @@
           </a:p>
         </p:txBody>
       </p:sp>
-      <p:pic>
-        <p:nvPicPr>
-          <p:cNvPr id="4" name="Picture 3"/>
-          <p:cNvPicPr>
-            <a:picLocks noChangeAspect="1"/>
-          </p:cNvPicPr>
-          <p:nvPr/>
-        </p:nvPicPr>
-        <p:blipFill>
-          <a:blip r:embed="rId2">
-            <a:extLst>
-              <a:ext uri="{28A0092B-C50C-407E-A947-70E740481C1C}">
-                <a14:useLocalDpi xmlns:a14="http://schemas.microsoft.com/office/drawing/2010/main" val="0"/>
-              </a:ext>
-            </a:extLst>
-          </a:blip>
-          <a:stretch>
-            <a:fillRect/>
-          </a:stretch>
-        </p:blipFill>
-        <p:spPr>
-          <a:xfrm>
-            <a:off x="6479712" y="1335233"/>
-            <a:ext cx="3994324" cy="5249992"/>
-          </a:xfrm>
-          <a:prstGeom prst="rect">
-            <a:avLst/>
-          </a:prstGeom>
-        </p:spPr>
-      </p:pic>
-      <p:pic>
-        <p:nvPicPr>
-          <p:cNvPr id="5" name="Picture 4"/>
-          <p:cNvPicPr>
-            <a:picLocks noChangeAspect="1"/>
-          </p:cNvPicPr>
-          <p:nvPr/>
-        </p:nvPicPr>
-        <p:blipFill>
-          <a:blip r:embed="rId3"/>
-          <a:stretch>
-            <a:fillRect/>
-          </a:stretch>
-        </p:blipFill>
-        <p:spPr>
-          <a:xfrm>
-            <a:off x="1006619" y="1335233"/>
-            <a:ext cx="4898382" cy="3270019"/>
-          </a:xfrm>
-          <a:prstGeom prst="rect">
-            <a:avLst/>
-          </a:prstGeom>
-        </p:spPr>
-      </p:pic>
     </p:spTree>
     <p:extLst>
       <p:ext uri="{BB962C8B-B14F-4D97-AF65-F5344CB8AC3E}">
-        <p14:creationId xmlns:p14="http://schemas.microsoft.com/office/powerpoint/2010/main" val="3368870173"/>
+        <p14:creationId xmlns:p14="http://schemas.microsoft.com/office/powerpoint/2010/main" val="1577005009"/>
       </p:ext>
     </p:extLst>
   </p:cSld>
@@ -5399,8 +5407,8 @@
         </p:nvSpPr>
         <p:spPr>
           <a:xfrm>
-            <a:off x="5112005" y="3013501"/>
-            <a:ext cx="3663696" cy="830997"/>
+            <a:off x="707785" y="295468"/>
+            <a:ext cx="10223070" cy="830997"/>
           </a:xfrm>
           <a:prstGeom prst="rect">
             <a:avLst/>
@@ -5427,7 +5435,7 @@
                   </a:outerShdw>
                 </a:effectLst>
               </a:rPr>
-              <a:t>Q &amp; A</a:t>
+              <a:t>Update – Default Encoding Preset</a:t>
             </a:r>
             <a:endParaRPr lang="en-US" sz="4800" b="0" cap="none" spc="0" dirty="0">
               <a:ln w="0"/>
@@ -5491,136 +5499,6 @@
           </a:p>
         </p:txBody>
       </p:sp>
-    </p:spTree>
-    <p:extLst>
-      <p:ext uri="{BB962C8B-B14F-4D97-AF65-F5344CB8AC3E}">
-        <p14:creationId xmlns:p14="http://schemas.microsoft.com/office/powerpoint/2010/main" val="1577005009"/>
-      </p:ext>
-    </p:extLst>
-  </p:cSld>
-  <p:clrMapOvr>
-    <a:masterClrMapping/>
-  </p:clrMapOvr>
-</p:sld>
-</file>
-
-<file path=ppt/slides/slide17.xml><?xml version="1.0" encoding="utf-8"?>
-<p:sld xmlns:a="http://schemas.openxmlformats.org/drawingml/2006/main" xmlns:r="http://schemas.openxmlformats.org/officeDocument/2006/relationships" xmlns:p="http://schemas.openxmlformats.org/presentationml/2006/main">
-  <p:cSld>
-    <p:spTree>
-      <p:nvGrpSpPr>
-        <p:cNvPr id="1" name=""/>
-        <p:cNvGrpSpPr/>
-        <p:nvPr/>
-      </p:nvGrpSpPr>
-      <p:grpSpPr>
-        <a:xfrm>
-          <a:off x="0" y="0"/>
-          <a:ext cx="0" cy="0"/>
-          <a:chOff x="0" y="0"/>
-          <a:chExt cx="0" cy="0"/>
-        </a:xfrm>
-      </p:grpSpPr>
-      <p:sp>
-        <p:nvSpPr>
-          <p:cNvPr id="2" name="Rectangle 1"/>
-          <p:cNvSpPr/>
-          <p:nvPr/>
-        </p:nvSpPr>
-        <p:spPr>
-          <a:xfrm>
-            <a:off x="707785" y="295468"/>
-            <a:ext cx="10223070" cy="830997"/>
-          </a:xfrm>
-          <a:prstGeom prst="rect">
-            <a:avLst/>
-          </a:prstGeom>
-          <a:noFill/>
-        </p:spPr>
-        <p:txBody>
-          <a:bodyPr wrap="square" lIns="91440" tIns="45720" rIns="91440" bIns="45720">
-            <a:spAutoFit/>
-          </a:bodyPr>
-          <a:lstStyle/>
-          <a:p>
-            <a:r>
-              <a:rPr lang="en-US" sz="4800" dirty="0">
-                <a:ln w="0"/>
-                <a:solidFill>
-                  <a:srgbClr val="00BCF2"/>
-                </a:solidFill>
-                <a:effectLst>
-                  <a:outerShdw blurRad="38100" dist="19050" dir="2700000" algn="tl" rotWithShape="0">
-                    <a:schemeClr val="dk1">
-                      <a:alpha val="40000"/>
-                    </a:schemeClr>
-                  </a:outerShdw>
-                </a:effectLst>
-              </a:rPr>
-              <a:t>Update – Default Encoding Preset</a:t>
-            </a:r>
-            <a:endParaRPr lang="en-US" sz="4800" b="0" cap="none" spc="0" dirty="0">
-              <a:ln w="0"/>
-              <a:solidFill>
-                <a:srgbClr val="00BCF2"/>
-              </a:solidFill>
-              <a:effectLst>
-                <a:outerShdw blurRad="38100" dist="19050" dir="2700000" algn="tl" rotWithShape="0">
-                  <a:schemeClr val="dk1">
-                    <a:alpha val="40000"/>
-                  </a:schemeClr>
-                </a:outerShdw>
-              </a:effectLst>
-            </a:endParaRPr>
-          </a:p>
-        </p:txBody>
-      </p:sp>
-      <p:sp>
-        <p:nvSpPr>
-          <p:cNvPr id="3" name="Rectangle 2"/>
-          <p:cNvSpPr/>
-          <p:nvPr/>
-        </p:nvSpPr>
-        <p:spPr>
-          <a:xfrm>
-            <a:off x="0" y="0"/>
-            <a:ext cx="182880" cy="6858000"/>
-          </a:xfrm>
-          <a:prstGeom prst="rect">
-            <a:avLst/>
-          </a:prstGeom>
-          <a:solidFill>
-            <a:srgbClr val="00BCF2"/>
-          </a:solidFill>
-          <a:ln>
-            <a:noFill/>
-          </a:ln>
-        </p:spPr>
-        <p:style>
-          <a:lnRef idx="2">
-            <a:schemeClr val="accent1">
-              <a:shade val="50000"/>
-            </a:schemeClr>
-          </a:lnRef>
-          <a:fillRef idx="1">
-            <a:schemeClr val="accent1"/>
-          </a:fillRef>
-          <a:effectRef idx="0">
-            <a:schemeClr val="accent1"/>
-          </a:effectRef>
-          <a:fontRef idx="minor">
-            <a:schemeClr val="lt1"/>
-          </a:fontRef>
-        </p:style>
-        <p:txBody>
-          <a:bodyPr rtlCol="0" anchor="ctr"/>
-          <a:lstStyle/>
-          <a:p>
-            <a:pPr algn="ctr"/>
-            <a:endParaRPr lang="en-US"/>
-          </a:p>
-        </p:txBody>
-      </p:sp>
       <p:pic>
         <p:nvPicPr>
           <p:cNvPr id="4" name="Picture 3"/>
@@ -5658,7 +5536,7 @@
 </p:sld>
 </file>
 
-<file path=ppt/slides/slide18.xml><?xml version="1.0" encoding="utf-8"?>
+<file path=ppt/slides/slide17.xml><?xml version="1.0" encoding="utf-8"?>
 <p:sld xmlns:a="http://schemas.openxmlformats.org/drawingml/2006/main" xmlns:r="http://schemas.openxmlformats.org/officeDocument/2006/relationships" xmlns:p="http://schemas.openxmlformats.org/presentationml/2006/main">
   <p:cSld>
     <p:spTree>
@@ -5879,7 +5757,7 @@
         <p:spPr>
           <a:xfrm>
             <a:off x="1263903" y="1645103"/>
-            <a:ext cx="9073897" cy="2954655"/>
+            <a:ext cx="9073897" cy="2092881"/>
           </a:xfrm>
           <a:prstGeom prst="rect">
             <a:avLst/>
@@ -5923,7 +5801,7 @@
                 </a:solidFill>
                 <a:latin typeface="Segoe UI" panose="020B0502040204020203" pitchFamily="34" charset="0"/>
               </a:rPr>
-              <a:t>Azure Media Service workflow</a:t>
+              <a:t>Packaging - traditional vs dynamic</a:t>
             </a:r>
           </a:p>
           <a:p>
@@ -5941,43 +5819,7 @@
                 </a:solidFill>
                 <a:latin typeface="Segoe UI" panose="020B0502040204020203" pitchFamily="34" charset="0"/>
               </a:rPr>
-              <a:t>Packaging - traditional vs dynamic</a:t>
-            </a:r>
-          </a:p>
-          <a:p>
-            <a:pPr marL="285750" indent="-285750">
-              <a:spcBef>
-                <a:spcPts val="1200"/>
-              </a:spcBef>
-              <a:buFont typeface="Wingdings" panose="05000000000000000000" pitchFamily="2" charset="2"/>
-              <a:buChar char="Ø"/>
-            </a:pPr>
-            <a:r>
-              <a:rPr lang="en-US" dirty="0">
-                <a:solidFill>
-                  <a:srgbClr val="505050"/>
-                </a:solidFill>
-                <a:latin typeface="Segoe UI" panose="020B0502040204020203" pitchFamily="34" charset="0"/>
-              </a:rPr>
               <a:t>Development options</a:t>
-            </a:r>
-          </a:p>
-          <a:p>
-            <a:pPr marL="285750" indent="-285750">
-              <a:spcBef>
-                <a:spcPts val="1200"/>
-              </a:spcBef>
-              <a:buFont typeface="Wingdings" panose="05000000000000000000" pitchFamily="2" charset="2"/>
-              <a:buChar char="Ø"/>
-            </a:pPr>
-            <a:r>
-              <a:rPr lang="en-US" dirty="0">
-                <a:solidFill>
-                  <a:srgbClr val="505050"/>
-                </a:solidFill>
-                <a:latin typeface="Segoe UI" panose="020B0502040204020203" pitchFamily="34" charset="0"/>
-              </a:rPr>
-              <a:t>Building console client</a:t>
             </a:r>
           </a:p>
           <a:p>

</xml_diff>